<commit_message>
Sessions 1 & 2 update
</commit_message>
<xml_diff>
--- a/Chanco_STA623_BDA_2022_Henrion_Session1.pptx
+++ b/Chanco_STA623_BDA_2022_Henrion_Session1.pptx
@@ -5731,7 +5731,7 @@
               <a:rPr>
                 <a:hlinkClick r:id="rId2"/>
               </a:rPr>
-              <a:t>https://github.com/gitMarcH/Chanco_STA6206</a:t>
+              <a:t>https://github.com/gitMarcH/UNIMA_STA623</a:t>
             </a:r>
           </a:p>
         </p:txBody>
@@ -19323,7 +19323,7 @@
             </a:pPr>
             <a:r>
               <a:rPr/>
-              <a:t>[end of STA6206 Bayesian Data analysis Session 1]</a:t>
+              <a:t>[end of STA623 Bayesian Data analysis Session 1]</a:t>
             </a:r>
           </a:p>
         </p:txBody>

</xml_diff>